<commit_message>
Minor chnages in documents
</commit_message>
<xml_diff>
--- a/Documents/PhoeniX Logo ideas.pptx
+++ b/Documents/PhoeniX Logo ideas.pptx
@@ -248,7 +248,7 @@
           <a:p>
             <a:fld id="{49D31AE7-621F-408D-ADF2-E78BA68C77B1}" type="datetimeFigureOut">
               <a:rPr lang="en-US" smtClean="0"/>
-              <a:t>8/14/2023</a:t>
+              <a:t>8/24/2023</a:t>
             </a:fld>
             <a:endParaRPr lang="en-US"/>
           </a:p>
@@ -418,7 +418,7 @@
           <a:p>
             <a:fld id="{49D31AE7-621F-408D-ADF2-E78BA68C77B1}" type="datetimeFigureOut">
               <a:rPr lang="en-US" smtClean="0"/>
-              <a:t>8/14/2023</a:t>
+              <a:t>8/24/2023</a:t>
             </a:fld>
             <a:endParaRPr lang="en-US"/>
           </a:p>
@@ -598,7 +598,7 @@
           <a:p>
             <a:fld id="{49D31AE7-621F-408D-ADF2-E78BA68C77B1}" type="datetimeFigureOut">
               <a:rPr lang="en-US" smtClean="0"/>
-              <a:t>8/14/2023</a:t>
+              <a:t>8/24/2023</a:t>
             </a:fld>
             <a:endParaRPr lang="en-US"/>
           </a:p>
@@ -768,7 +768,7 @@
           <a:p>
             <a:fld id="{49D31AE7-621F-408D-ADF2-E78BA68C77B1}" type="datetimeFigureOut">
               <a:rPr lang="en-US" smtClean="0"/>
-              <a:t>8/14/2023</a:t>
+              <a:t>8/24/2023</a:t>
             </a:fld>
             <a:endParaRPr lang="en-US"/>
           </a:p>
@@ -1014,7 +1014,7 @@
           <a:p>
             <a:fld id="{49D31AE7-621F-408D-ADF2-E78BA68C77B1}" type="datetimeFigureOut">
               <a:rPr lang="en-US" smtClean="0"/>
-              <a:t>8/14/2023</a:t>
+              <a:t>8/24/2023</a:t>
             </a:fld>
             <a:endParaRPr lang="en-US"/>
           </a:p>
@@ -1246,7 +1246,7 @@
           <a:p>
             <a:fld id="{49D31AE7-621F-408D-ADF2-E78BA68C77B1}" type="datetimeFigureOut">
               <a:rPr lang="en-US" smtClean="0"/>
-              <a:t>8/14/2023</a:t>
+              <a:t>8/24/2023</a:t>
             </a:fld>
             <a:endParaRPr lang="en-US"/>
           </a:p>
@@ -1613,7 +1613,7 @@
           <a:p>
             <a:fld id="{49D31AE7-621F-408D-ADF2-E78BA68C77B1}" type="datetimeFigureOut">
               <a:rPr lang="en-US" smtClean="0"/>
-              <a:t>8/14/2023</a:t>
+              <a:t>8/24/2023</a:t>
             </a:fld>
             <a:endParaRPr lang="en-US"/>
           </a:p>
@@ -1731,7 +1731,7 @@
           <a:p>
             <a:fld id="{49D31AE7-621F-408D-ADF2-E78BA68C77B1}" type="datetimeFigureOut">
               <a:rPr lang="en-US" smtClean="0"/>
-              <a:t>8/14/2023</a:t>
+              <a:t>8/24/2023</a:t>
             </a:fld>
             <a:endParaRPr lang="en-US"/>
           </a:p>
@@ -1826,7 +1826,7 @@
           <a:p>
             <a:fld id="{49D31AE7-621F-408D-ADF2-E78BA68C77B1}" type="datetimeFigureOut">
               <a:rPr lang="en-US" smtClean="0"/>
-              <a:t>8/14/2023</a:t>
+              <a:t>8/24/2023</a:t>
             </a:fld>
             <a:endParaRPr lang="en-US"/>
           </a:p>
@@ -2103,7 +2103,7 @@
           <a:p>
             <a:fld id="{49D31AE7-621F-408D-ADF2-E78BA68C77B1}" type="datetimeFigureOut">
               <a:rPr lang="en-US" smtClean="0"/>
-              <a:t>8/14/2023</a:t>
+              <a:t>8/24/2023</a:t>
             </a:fld>
             <a:endParaRPr lang="en-US"/>
           </a:p>
@@ -2356,7 +2356,7 @@
           <a:p>
             <a:fld id="{49D31AE7-621F-408D-ADF2-E78BA68C77B1}" type="datetimeFigureOut">
               <a:rPr lang="en-US" smtClean="0"/>
-              <a:t>8/14/2023</a:t>
+              <a:t>8/24/2023</a:t>
             </a:fld>
             <a:endParaRPr lang="en-US"/>
           </a:p>
@@ -2569,7 +2569,7 @@
           <a:p>
             <a:fld id="{49D31AE7-621F-408D-ADF2-E78BA68C77B1}" type="datetimeFigureOut">
               <a:rPr lang="en-US" smtClean="0"/>
-              <a:t>8/14/2023</a:t>
+              <a:t>8/24/2023</a:t>
             </a:fld>
             <a:endParaRPr lang="en-US"/>
           </a:p>
@@ -2997,10 +2997,10 @@
           <a:lstStyle/>
           <a:p>
             <a:r>
-              <a:rPr lang="en-US" sz="13800" dirty="0" smtClean="0">
+              <a:rPr lang="en-US" sz="13800" dirty="0" err="1" smtClean="0">
                 <a:latin typeface="Tw Cen MT" panose="020B0602020104020603" pitchFamily="34" charset="0"/>
               </a:rPr>
-              <a:t>Pheoni</a:t>
+              <a:t>Phoeni</a:t>
             </a:r>
             <a:endParaRPr lang="en-US" sz="13800" dirty="0">
               <a:latin typeface="Tw Cen MT" panose="020B0602020104020603" pitchFamily="34" charset="0"/>
@@ -3095,10 +3095,10 @@
           <a:lstStyle/>
           <a:p>
             <a:r>
-              <a:rPr lang="en-US" sz="13800" dirty="0" smtClean="0">
+              <a:rPr lang="en-US" sz="13800" dirty="0" err="1" smtClean="0">
                 <a:latin typeface="Tw Cen MT" panose="020B0602020104020603" pitchFamily="34" charset="0"/>
               </a:rPr>
-              <a:t>Pheoni</a:t>
+              <a:t>Phoeni</a:t>
             </a:r>
             <a:endParaRPr lang="en-US" sz="13800" dirty="0">
               <a:latin typeface="Tw Cen MT" panose="020B0602020104020603" pitchFamily="34" charset="0"/>
@@ -3278,20 +3278,12 @@
           <a:lstStyle/>
           <a:p>
             <a:r>
-              <a:rPr lang="en-US" sz="13800" dirty="0" smtClean="0">
+              <a:rPr lang="en-US" sz="13800" dirty="0" err="1" smtClean="0">
                 <a:latin typeface="Century Gothic" panose="020B0502020202020204" pitchFamily="34" charset="0"/>
                 <a:ea typeface="Sans Serif Collection" panose="020B0502040504020204" pitchFamily="34" charset="0"/>
                 <a:cs typeface="Sans Serif Collection" panose="020B0502040504020204" pitchFamily="34" charset="0"/>
               </a:rPr>
-              <a:t>Pheon</a:t>
-            </a:r>
-            <a:r>
-              <a:rPr lang="en-US" sz="13800" dirty="0">
-                <a:latin typeface="Century Gothic" panose="020B0502020202020204" pitchFamily="34" charset="0"/>
-                <a:ea typeface="Sans Serif Collection" panose="020B0502040504020204" pitchFamily="34" charset="0"/>
-                <a:cs typeface="Sans Serif Collection" panose="020B0502040504020204" pitchFamily="34" charset="0"/>
-              </a:rPr>
-              <a:t>i</a:t>
+              <a:t>Phoeni</a:t>
             </a:r>
             <a:endParaRPr lang="en-US" sz="13800" dirty="0">
               <a:latin typeface="Century Gothic" panose="020B0502020202020204" pitchFamily="34" charset="0"/>
@@ -3366,7 +3358,7 @@
         </p:blipFill>
         <p:spPr>
           <a:xfrm>
-            <a:off x="5229225" y="3162300"/>
+            <a:off x="4092220" y="3162300"/>
             <a:ext cx="486762" cy="572049"/>
           </a:xfrm>
           <a:prstGeom prst="rect">
@@ -3442,11 +3434,6 @@
               </a:rPr>
               <a:t>i</a:t>
             </a:r>
-            <a:endParaRPr lang="en-US" sz="13800" dirty="0">
-              <a:latin typeface="Century Gothic" panose="020B0502020202020204" pitchFamily="34" charset="0"/>
-              <a:ea typeface="Sans Serif Collection" panose="020B0502040504020204" pitchFamily="34" charset="0"/>
-              <a:cs typeface="Sans Serif Collection" panose="020B0502040504020204" pitchFamily="34" charset="0"/>
-            </a:endParaRPr>
           </a:p>
         </p:txBody>
       </p:sp>
@@ -3577,10 +3564,10 @@
           <a:lstStyle/>
           <a:p>
             <a:r>
-              <a:rPr lang="en-US" sz="13800" dirty="0" smtClean="0">
+              <a:rPr lang="en-US" sz="13800" dirty="0" err="1" smtClean="0">
                 <a:latin typeface="Trebuchet MS" panose="020B0603020202020204" pitchFamily="34" charset="0"/>
               </a:rPr>
-              <a:t>Pheoni</a:t>
+              <a:t>Phoeni</a:t>
             </a:r>
             <a:endParaRPr lang="en-US" sz="13800" dirty="0">
               <a:latin typeface="Trebuchet MS" panose="020B0603020202020204" pitchFamily="34" charset="0"/>
@@ -3737,172 +3724,187 @@
           <a:chExt cx="0" cy="0"/>
         </a:xfrm>
       </p:grpSpPr>
-      <p:sp>
-        <p:nvSpPr>
-          <p:cNvPr id="4" name="TextBox 3"/>
-          <p:cNvSpPr txBox="1"/>
+      <p:grpSp>
+        <p:nvGrpSpPr>
+          <p:cNvPr id="3" name="Group 2"/>
+          <p:cNvGrpSpPr/>
           <p:nvPr/>
-        </p:nvSpPr>
-        <p:spPr>
+        </p:nvGrpSpPr>
+        <p:grpSpPr>
           <a:xfrm>
-            <a:off x="2161310" y="2152439"/>
-            <a:ext cx="5441298" cy="2215991"/>
+            <a:off x="2161310" y="1487054"/>
+            <a:ext cx="7508501" cy="3154710"/>
+            <a:chOff x="2161310" y="1487054"/>
+            <a:chExt cx="7508501" cy="3154710"/>
           </a:xfrm>
-          <a:prstGeom prst="rect">
-            <a:avLst/>
-          </a:prstGeom>
-          <a:noFill/>
-        </p:spPr>
-        <p:txBody>
-          <a:bodyPr wrap="none" rtlCol="0">
-            <a:spAutoFit/>
-          </a:bodyPr>
-          <a:lstStyle/>
-          <a:p>
-            <a:r>
-              <a:rPr lang="en-US" sz="13800" dirty="0" smtClean="0">
+        </p:grpSpPr>
+        <p:sp>
+          <p:nvSpPr>
+            <p:cNvPr id="4" name="TextBox 3"/>
+            <p:cNvSpPr txBox="1"/>
+            <p:nvPr/>
+          </p:nvSpPr>
+          <p:spPr>
+            <a:xfrm>
+              <a:off x="2161310" y="2152439"/>
+              <a:ext cx="5522666" cy="2215991"/>
+            </a:xfrm>
+            <a:prstGeom prst="rect">
+              <a:avLst/>
+            </a:prstGeom>
+            <a:noFill/>
+          </p:spPr>
+          <p:txBody>
+            <a:bodyPr wrap="none" rtlCol="0">
+              <a:spAutoFit/>
+            </a:bodyPr>
+            <a:lstStyle/>
+            <a:p>
+              <a:r>
+                <a:rPr lang="en-US" sz="13800" dirty="0" err="1" smtClean="0">
+                  <a:solidFill>
+                    <a:schemeClr val="bg1"/>
+                  </a:solidFill>
+                  <a:latin typeface="Trebuchet MS" panose="020B0603020202020204" pitchFamily="34" charset="0"/>
+                </a:rPr>
+                <a:t>phoeni</a:t>
+              </a:r>
+              <a:endParaRPr lang="en-US" sz="13800" dirty="0">
                 <a:solidFill>
                   <a:schemeClr val="bg1"/>
                 </a:solidFill>
                 <a:latin typeface="Trebuchet MS" panose="020B0603020202020204" pitchFamily="34" charset="0"/>
-              </a:rPr>
-              <a:t>Pheoni</a:t>
-            </a:r>
-            <a:endParaRPr lang="en-US" sz="13800" dirty="0">
-              <a:solidFill>
-                <a:schemeClr val="bg1"/>
-              </a:solidFill>
-              <a:latin typeface="Trebuchet MS" panose="020B0603020202020204" pitchFamily="34" charset="0"/>
-            </a:endParaRPr>
-          </a:p>
-        </p:txBody>
-      </p:sp>
-      <p:sp>
-        <p:nvSpPr>
-          <p:cNvPr id="5" name="TextBox 4"/>
-          <p:cNvSpPr txBox="1"/>
-          <p:nvPr/>
-        </p:nvSpPr>
-        <p:spPr>
-          <a:xfrm>
-            <a:off x="7135143" y="1487054"/>
-            <a:ext cx="2534668" cy="3154710"/>
-          </a:xfrm>
-          <a:prstGeom prst="rect">
-            <a:avLst/>
-          </a:prstGeom>
-          <a:noFill/>
-        </p:spPr>
-        <p:txBody>
-          <a:bodyPr wrap="none" rtlCol="0">
-            <a:spAutoFit/>
-          </a:bodyPr>
-          <a:lstStyle/>
-          <a:p>
-            <a:r>
-              <a:rPr lang="en-US" sz="19900" dirty="0" smtClean="0">
+              </a:endParaRPr>
+            </a:p>
+          </p:txBody>
+        </p:sp>
+        <p:sp>
+          <p:nvSpPr>
+            <p:cNvPr id="5" name="TextBox 4"/>
+            <p:cNvSpPr txBox="1"/>
+            <p:nvPr/>
+          </p:nvSpPr>
+          <p:spPr>
+            <a:xfrm>
+              <a:off x="7135143" y="1487054"/>
+              <a:ext cx="2534668" cy="3154710"/>
+            </a:xfrm>
+            <a:prstGeom prst="rect">
+              <a:avLst/>
+            </a:prstGeom>
+            <a:noFill/>
+          </p:spPr>
+          <p:txBody>
+            <a:bodyPr wrap="none" rtlCol="0">
+              <a:spAutoFit/>
+            </a:bodyPr>
+            <a:lstStyle/>
+            <a:p>
+              <a:r>
+                <a:rPr lang="en-US" sz="19900" dirty="0" smtClean="0">
+                  <a:solidFill>
+                    <a:schemeClr val="bg1"/>
+                  </a:solidFill>
+                  <a:latin typeface="Xperia" pitchFamily="2" charset="0"/>
+                </a:rPr>
+                <a:t>X</a:t>
+              </a:r>
+              <a:endParaRPr lang="en-US" sz="19900" dirty="0">
                 <a:solidFill>
                   <a:schemeClr val="bg1"/>
                 </a:solidFill>
                 <a:latin typeface="Xperia" pitchFamily="2" charset="0"/>
-              </a:rPr>
-              <a:t>X</a:t>
-            </a:r>
-            <a:endParaRPr lang="en-US" sz="19900" dirty="0">
-              <a:solidFill>
-                <a:schemeClr val="bg1"/>
-              </a:solidFill>
-              <a:latin typeface="Xperia" pitchFamily="2" charset="0"/>
-            </a:endParaRPr>
-          </a:p>
-        </p:txBody>
-      </p:sp>
-      <p:sp>
-        <p:nvSpPr>
-          <p:cNvPr id="2" name="Rectangle 1"/>
-          <p:cNvSpPr/>
-          <p:nvPr/>
-        </p:nvSpPr>
-        <p:spPr>
-          <a:xfrm>
-            <a:off x="7038109" y="2567709"/>
-            <a:ext cx="406400" cy="277091"/>
-          </a:xfrm>
-          <a:prstGeom prst="rect">
-            <a:avLst/>
-          </a:prstGeom>
-          <a:solidFill>
-            <a:schemeClr val="tx1"/>
-          </a:solidFill>
-          <a:ln>
+              </a:endParaRPr>
+            </a:p>
+          </p:txBody>
+        </p:sp>
+        <p:sp>
+          <p:nvSpPr>
+            <p:cNvPr id="2" name="Rectangle 1"/>
+            <p:cNvSpPr/>
+            <p:nvPr/>
+          </p:nvSpPr>
+          <p:spPr>
+            <a:xfrm>
+              <a:off x="7038109" y="2567709"/>
+              <a:ext cx="406400" cy="277091"/>
+            </a:xfrm>
+            <a:prstGeom prst="rect">
+              <a:avLst/>
+            </a:prstGeom>
             <a:solidFill>
               <a:schemeClr val="tx1"/>
             </a:solidFill>
-          </a:ln>
-        </p:spPr>
-        <p:style>
-          <a:lnRef idx="2">
-            <a:schemeClr val="accent1">
-              <a:shade val="50000"/>
-            </a:schemeClr>
-          </a:lnRef>
-          <a:fillRef idx="1">
-            <a:schemeClr val="accent1"/>
-          </a:fillRef>
-          <a:effectRef idx="0">
-            <a:schemeClr val="accent1"/>
-          </a:effectRef>
-          <a:fontRef idx="minor">
-            <a:schemeClr val="lt1"/>
-          </a:fontRef>
-        </p:style>
-        <p:txBody>
-          <a:bodyPr rtlCol="0" anchor="ctr"/>
-          <a:lstStyle/>
-          <a:p>
-            <a:pPr algn="ctr"/>
-            <a:endParaRPr lang="en-US"/>
-          </a:p>
-        </p:txBody>
-      </p:sp>
-      <p:pic>
-        <p:nvPicPr>
-          <p:cNvPr id="6" name="Picture 5"/>
-          <p:cNvPicPr>
-            <a:picLocks noChangeAspect="1"/>
-          </p:cNvPicPr>
-          <p:nvPr/>
-        </p:nvPicPr>
-        <p:blipFill rotWithShape="1">
-          <a:blip r:embed="rId2">
-            <a:extLst>
-              <a:ext uri="{BEBA8EAE-BF5A-486C-A8C5-ECC9F3942E4B}">
-                <a14:imgProps xmlns:a14="http://schemas.microsoft.com/office/drawing/2010/main">
-                  <a14:imgLayer r:embed="rId3">
-                    <a14:imgEffect>
-                      <a14:brightnessContrast contrast="40000"/>
-                    </a14:imgEffect>
-                  </a14:imgLayer>
-                </a14:imgProps>
-              </a:ext>
-              <a:ext uri="{28A0092B-C50C-407E-A947-70E740481C1C}">
-                <a14:useLocalDpi xmlns:a14="http://schemas.microsoft.com/office/drawing/2010/main" val="0"/>
-              </a:ext>
-            </a:extLst>
-          </a:blip>
-          <a:srcRect l="39173" r="35121" b="82483"/>
-          <a:stretch/>
-        </p:blipFill>
-        <p:spPr>
-          <a:xfrm>
-            <a:off x="6990014" y="2615769"/>
-            <a:ext cx="454495" cy="313666"/>
-          </a:xfrm>
-          <a:prstGeom prst="rect">
-            <a:avLst/>
-          </a:prstGeom>
-        </p:spPr>
-      </p:pic>
+            <a:ln>
+              <a:solidFill>
+                <a:schemeClr val="tx1"/>
+              </a:solidFill>
+            </a:ln>
+          </p:spPr>
+          <p:style>
+            <a:lnRef idx="2">
+              <a:schemeClr val="accent1">
+                <a:shade val="50000"/>
+              </a:schemeClr>
+            </a:lnRef>
+            <a:fillRef idx="1">
+              <a:schemeClr val="accent1"/>
+            </a:fillRef>
+            <a:effectRef idx="0">
+              <a:schemeClr val="accent1"/>
+            </a:effectRef>
+            <a:fontRef idx="minor">
+              <a:schemeClr val="lt1"/>
+            </a:fontRef>
+          </p:style>
+          <p:txBody>
+            <a:bodyPr rtlCol="0" anchor="ctr"/>
+            <a:lstStyle/>
+            <a:p>
+              <a:pPr algn="ctr"/>
+              <a:endParaRPr lang="en-US"/>
+            </a:p>
+          </p:txBody>
+        </p:sp>
+        <p:pic>
+          <p:nvPicPr>
+            <p:cNvPr id="6" name="Picture 5"/>
+            <p:cNvPicPr>
+              <a:picLocks noChangeAspect="1"/>
+            </p:cNvPicPr>
+            <p:nvPr/>
+          </p:nvPicPr>
+          <p:blipFill rotWithShape="1">
+            <a:blip r:embed="rId2">
+              <a:extLst>
+                <a:ext uri="{BEBA8EAE-BF5A-486C-A8C5-ECC9F3942E4B}">
+                  <a14:imgProps xmlns:a14="http://schemas.microsoft.com/office/drawing/2010/main">
+                    <a14:imgLayer r:embed="rId3">
+                      <a14:imgEffect>
+                        <a14:brightnessContrast contrast="40000"/>
+                      </a14:imgEffect>
+                    </a14:imgLayer>
+                  </a14:imgProps>
+                </a:ext>
+                <a:ext uri="{28A0092B-C50C-407E-A947-70E740481C1C}">
+                  <a14:useLocalDpi xmlns:a14="http://schemas.microsoft.com/office/drawing/2010/main" val="0"/>
+                </a:ext>
+              </a:extLst>
+            </a:blip>
+            <a:srcRect l="39173" r="35121" b="82483"/>
+            <a:stretch/>
+          </p:blipFill>
+          <p:spPr>
+            <a:xfrm>
+              <a:off x="7063902" y="2615769"/>
+              <a:ext cx="454495" cy="313666"/>
+            </a:xfrm>
+            <a:prstGeom prst="rect">
+              <a:avLst/>
+            </a:prstGeom>
+          </p:spPr>
+        </p:pic>
+      </p:grpSp>
     </p:spTree>
     <p:extLst>
       <p:ext uri="{BB962C8B-B14F-4D97-AF65-F5344CB8AC3E}">

</xml_diff>